<commit_message>
Update Snakemake x Targets TL.pptx
</commit_message>
<xml_diff>
--- a/Snakemake x Targets TL.pptx
+++ b/Snakemake x Targets TL.pptx
@@ -5,7 +5,7 @@
     <p:sldMasterId id="2147483648" r:id="rId1"/>
   </p:sldMasterIdLst>
   <p:notesMasterIdLst>
-    <p:notesMasterId r:id="rId15"/>
+    <p:notesMasterId r:id="rId17"/>
   </p:notesMasterIdLst>
   <p:sldIdLst>
     <p:sldId id="256" r:id="rId2"/>
@@ -18,9 +18,11 @@
     <p:sldId id="264" r:id="rId9"/>
     <p:sldId id="265" r:id="rId10"/>
     <p:sldId id="266" r:id="rId11"/>
-    <p:sldId id="272" r:id="rId12"/>
-    <p:sldId id="268" r:id="rId13"/>
-    <p:sldId id="269" r:id="rId14"/>
+    <p:sldId id="274" r:id="rId12"/>
+    <p:sldId id="272" r:id="rId13"/>
+    <p:sldId id="268" r:id="rId14"/>
+    <p:sldId id="269" r:id="rId15"/>
+    <p:sldId id="273" r:id="rId16"/>
   </p:sldIdLst>
   <p:sldSz cx="12192000" cy="6858000"/>
   <p:notesSz cx="6858000" cy="9144000"/>
@@ -209,7 +211,7 @@
           <a:p>
             <a:fld id="{88A1EE58-785B-4E4E-ADC5-C224D4A02A53}" type="datetimeFigureOut">
               <a:rPr lang="en-GB" smtClean="0"/>
-              <a:t>14/12/2020</a:t>
+              <a:t>15/12/2020</a:t>
             </a:fld>
             <a:endParaRPr lang="en-GB"/>
           </a:p>
@@ -835,7 +837,10 @@
               <a:buFontTx/>
               <a:buChar char="-"/>
             </a:pPr>
-            <a:endParaRPr lang="en-GB" dirty="0"/>
+            <a:r>
+              <a:rPr lang="en-GB" dirty="0"/>
+              <a:t>Save some disk IO</a:t>
+            </a:r>
           </a:p>
         </p:txBody>
       </p:sp>
@@ -940,7 +945,7 @@
           <a:p>
             <a:fld id="{1A788AD6-68E8-48C8-A141-8BF57488E3BD}" type="slidenum">
               <a:rPr lang="en-GB" smtClean="0"/>
-              <a:t>12</a:t>
+              <a:t>13</a:t>
             </a:fld>
             <a:endParaRPr lang="en-GB"/>
           </a:p>
@@ -1024,7 +1029,7 @@
           <a:p>
             <a:fld id="{1A788AD6-68E8-48C8-A141-8BF57488E3BD}" type="slidenum">
               <a:rPr lang="en-GB" smtClean="0"/>
-              <a:t>13</a:t>
+              <a:t>14</a:t>
             </a:fld>
             <a:endParaRPr lang="en-GB"/>
           </a:p>
@@ -1192,7 +1197,7 @@
           <a:p>
             <a:fld id="{9EFA9E73-36B0-4BD7-9C3B-65F35A502ACA}" type="datetimeFigureOut">
               <a:rPr lang="en-GB" smtClean="0"/>
-              <a:t>14/12/2020</a:t>
+              <a:t>15/12/2020</a:t>
             </a:fld>
             <a:endParaRPr lang="en-GB"/>
           </a:p>
@@ -1392,7 +1397,7 @@
           <a:p>
             <a:fld id="{9EFA9E73-36B0-4BD7-9C3B-65F35A502ACA}" type="datetimeFigureOut">
               <a:rPr lang="en-GB" smtClean="0"/>
-              <a:t>14/12/2020</a:t>
+              <a:t>15/12/2020</a:t>
             </a:fld>
             <a:endParaRPr lang="en-GB"/>
           </a:p>
@@ -1602,7 +1607,7 @@
           <a:p>
             <a:fld id="{9EFA9E73-36B0-4BD7-9C3B-65F35A502ACA}" type="datetimeFigureOut">
               <a:rPr lang="en-GB" smtClean="0"/>
-              <a:t>14/12/2020</a:t>
+              <a:t>15/12/2020</a:t>
             </a:fld>
             <a:endParaRPr lang="en-GB"/>
           </a:p>
@@ -1802,7 +1807,7 @@
           <a:p>
             <a:fld id="{9EFA9E73-36B0-4BD7-9C3B-65F35A502ACA}" type="datetimeFigureOut">
               <a:rPr lang="en-GB" smtClean="0"/>
-              <a:t>14/12/2020</a:t>
+              <a:t>15/12/2020</a:t>
             </a:fld>
             <a:endParaRPr lang="en-GB"/>
           </a:p>
@@ -2078,7 +2083,7 @@
           <a:p>
             <a:fld id="{9EFA9E73-36B0-4BD7-9C3B-65F35A502ACA}" type="datetimeFigureOut">
               <a:rPr lang="en-GB" smtClean="0"/>
-              <a:t>14/12/2020</a:t>
+              <a:t>15/12/2020</a:t>
             </a:fld>
             <a:endParaRPr lang="en-GB"/>
           </a:p>
@@ -2346,7 +2351,7 @@
           <a:p>
             <a:fld id="{9EFA9E73-36B0-4BD7-9C3B-65F35A502ACA}" type="datetimeFigureOut">
               <a:rPr lang="en-GB" smtClean="0"/>
-              <a:t>14/12/2020</a:t>
+              <a:t>15/12/2020</a:t>
             </a:fld>
             <a:endParaRPr lang="en-GB"/>
           </a:p>
@@ -2761,7 +2766,7 @@
           <a:p>
             <a:fld id="{9EFA9E73-36B0-4BD7-9C3B-65F35A502ACA}" type="datetimeFigureOut">
               <a:rPr lang="en-GB" smtClean="0"/>
-              <a:t>14/12/2020</a:t>
+              <a:t>15/12/2020</a:t>
             </a:fld>
             <a:endParaRPr lang="en-GB"/>
           </a:p>
@@ -2903,7 +2908,7 @@
           <a:p>
             <a:fld id="{9EFA9E73-36B0-4BD7-9C3B-65F35A502ACA}" type="datetimeFigureOut">
               <a:rPr lang="en-GB" smtClean="0"/>
-              <a:t>14/12/2020</a:t>
+              <a:t>15/12/2020</a:t>
             </a:fld>
             <a:endParaRPr lang="en-GB"/>
           </a:p>
@@ -3016,7 +3021,7 @@
           <a:p>
             <a:fld id="{9EFA9E73-36B0-4BD7-9C3B-65F35A502ACA}" type="datetimeFigureOut">
               <a:rPr lang="en-GB" smtClean="0"/>
-              <a:t>14/12/2020</a:t>
+              <a:t>15/12/2020</a:t>
             </a:fld>
             <a:endParaRPr lang="en-GB"/>
           </a:p>
@@ -3329,7 +3334,7 @@
           <a:p>
             <a:fld id="{9EFA9E73-36B0-4BD7-9C3B-65F35A502ACA}" type="datetimeFigureOut">
               <a:rPr lang="en-GB" smtClean="0"/>
-              <a:t>14/12/2020</a:t>
+              <a:t>15/12/2020</a:t>
             </a:fld>
             <a:endParaRPr lang="en-GB"/>
           </a:p>
@@ -3618,7 +3623,7 @@
           <a:p>
             <a:fld id="{9EFA9E73-36B0-4BD7-9C3B-65F35A502ACA}" type="datetimeFigureOut">
               <a:rPr lang="en-GB" smtClean="0"/>
-              <a:t>14/12/2020</a:t>
+              <a:t>15/12/2020</a:t>
             </a:fld>
             <a:endParaRPr lang="en-GB"/>
           </a:p>
@@ -3861,7 +3866,7 @@
           <a:p>
             <a:fld id="{9EFA9E73-36B0-4BD7-9C3B-65F35A502ACA}" type="datetimeFigureOut">
               <a:rPr lang="en-GB" smtClean="0"/>
-              <a:t>14/12/2020</a:t>
+              <a:t>15/12/2020</a:t>
             </a:fld>
             <a:endParaRPr lang="en-GB"/>
           </a:p>
@@ -4455,6 +4460,14 @@
 <file path=ppt/slides/slide11.xml><?xml version="1.0" encoding="utf-8"?>
 <p:sld xmlns:a="http://schemas.openxmlformats.org/drawingml/2006/main" xmlns:r="http://schemas.openxmlformats.org/officeDocument/2006/relationships" xmlns:p="http://schemas.openxmlformats.org/presentationml/2006/main">
   <p:cSld>
+    <p:bg>
+      <p:bgPr>
+        <a:solidFill>
+          <a:schemeClr val="bg1"/>
+        </a:solidFill>
+        <a:effectLst/>
+      </p:bgPr>
+    </p:bg>
     <p:spTree>
       <p:nvGrpSpPr>
         <p:cNvPr id="1" name=""/>
@@ -4471,105 +4484,200 @@
       </p:grpSpPr>
       <p:sp>
         <p:nvSpPr>
-          <p:cNvPr id="2" name="Title 1">
-            <a:extLst>
-              <a:ext uri="{FF2B5EF4-FFF2-40B4-BE49-F238E27FC236}">
-                <a16:creationId xmlns:a16="http://schemas.microsoft.com/office/drawing/2014/main" id="{5EDAE18A-4307-48B1-B0F5-D03F02060835}"/>
-              </a:ext>
-            </a:extLst>
-          </p:cNvPr>
-          <p:cNvSpPr>
-            <a:spLocks noGrp="1"/>
-          </p:cNvSpPr>
-          <p:nvPr>
-            <p:ph type="title"/>
-          </p:nvPr>
-        </p:nvSpPr>
-        <p:spPr/>
-        <p:txBody>
-          <a:bodyPr/>
-          <a:lstStyle/>
-          <a:p>
-            <a:r>
-              <a:rPr lang="en-GB" dirty="0"/>
-              <a:t>Targets</a:t>
-            </a:r>
-          </a:p>
-        </p:txBody>
-      </p:sp>
-      <p:sp>
-        <p:nvSpPr>
-          <p:cNvPr id="3" name="Content Placeholder 2">
-            <a:extLst>
-              <a:ext uri="{FF2B5EF4-FFF2-40B4-BE49-F238E27FC236}">
-                <a16:creationId xmlns:a16="http://schemas.microsoft.com/office/drawing/2014/main" id="{43E035D1-4941-490A-8C07-78464D93B22F}"/>
-              </a:ext>
-            </a:extLst>
-          </p:cNvPr>
-          <p:cNvSpPr>
-            <a:spLocks noGrp="1"/>
-          </p:cNvSpPr>
+          <p:cNvPr id="10" name="Rectangle 9">
+            <a:extLst>
+              <a:ext uri="{FF2B5EF4-FFF2-40B4-BE49-F238E27FC236}">
+                <a16:creationId xmlns:a16="http://schemas.microsoft.com/office/drawing/2014/main" id="{42A4FC2C-047E-45A5-965D-8E1E3BF09BC6}"/>
+              </a:ext>
+              <a:ext uri="{C183D7F6-B498-43B3-948B-1728B52AA6E4}">
+                <adec:decorative xmlns:adec="http://schemas.microsoft.com/office/drawing/2017/decorative" val="1"/>
+              </a:ext>
+            </a:extLst>
+          </p:cNvPr>
+          <p:cNvSpPr>
+            <a:spLocks noGrp="1" noRot="1" noChangeAspect="1" noMove="1" noResize="1" noEditPoints="1" noAdjustHandles="1" noChangeArrowheads="1" noChangeShapeType="1" noTextEdit="1"/>
+          </p:cNvSpPr>
+          <p:nvPr>
+            <p:extLst>
+              <p:ext uri="{386F3935-93C4-4BCD-93E2-E3B085C9AB24}">
+                <p16:designElem xmlns:p16="http://schemas.microsoft.com/office/powerpoint/2015/main" val="1"/>
+              </p:ext>
+            </p:extLst>
+          </p:nvPr>
+        </p:nvSpPr>
+        <p:spPr bwMode="white">
+          <a:xfrm>
+            <a:off x="1524" y="0"/>
+            <a:ext cx="12188952" cy="6858000"/>
+          </a:xfrm>
+          <a:prstGeom prst="rect">
+            <a:avLst/>
+          </a:prstGeom>
+          <a:noFill/>
+          <a:ln>
+            <a:noFill/>
+          </a:ln>
+        </p:spPr>
+        <p:style>
+          <a:lnRef idx="2">
+            <a:schemeClr val="accent1">
+              <a:shade val="50000"/>
+            </a:schemeClr>
+          </a:lnRef>
+          <a:fillRef idx="1">
+            <a:schemeClr val="accent1"/>
+          </a:fillRef>
+          <a:effectRef idx="0">
+            <a:schemeClr val="accent1"/>
+          </a:effectRef>
+          <a:fontRef idx="minor">
+            <a:schemeClr val="lt1"/>
+          </a:fontRef>
+        </p:style>
+        <p:txBody>
+          <a:bodyPr rtlCol="0" anchor="ctr"/>
+          <a:lstStyle>
+            <a:defPPr>
+              <a:defRPr lang="en-US"/>
+            </a:defPPr>
+            <a:lvl1pPr marL="0" algn="l" defTabSz="914400" rtl="0" eaLnBrk="1" latinLnBrk="0" hangingPunct="1">
+              <a:defRPr sz="1800" kern="1200">
+                <a:solidFill>
+                  <a:schemeClr val="lt1"/>
+                </a:solidFill>
+                <a:latin typeface="+mn-lt"/>
+                <a:ea typeface="+mn-ea"/>
+                <a:cs typeface="+mn-cs"/>
+              </a:defRPr>
+            </a:lvl1pPr>
+            <a:lvl2pPr marL="457200" algn="l" defTabSz="914400" rtl="0" eaLnBrk="1" latinLnBrk="0" hangingPunct="1">
+              <a:defRPr sz="1800" kern="1200">
+                <a:solidFill>
+                  <a:schemeClr val="lt1"/>
+                </a:solidFill>
+                <a:latin typeface="+mn-lt"/>
+                <a:ea typeface="+mn-ea"/>
+                <a:cs typeface="+mn-cs"/>
+              </a:defRPr>
+            </a:lvl2pPr>
+            <a:lvl3pPr marL="914400" algn="l" defTabSz="914400" rtl="0" eaLnBrk="1" latinLnBrk="0" hangingPunct="1">
+              <a:defRPr sz="1800" kern="1200">
+                <a:solidFill>
+                  <a:schemeClr val="lt1"/>
+                </a:solidFill>
+                <a:latin typeface="+mn-lt"/>
+                <a:ea typeface="+mn-ea"/>
+                <a:cs typeface="+mn-cs"/>
+              </a:defRPr>
+            </a:lvl3pPr>
+            <a:lvl4pPr marL="1371600" algn="l" defTabSz="914400" rtl="0" eaLnBrk="1" latinLnBrk="0" hangingPunct="1">
+              <a:defRPr sz="1800" kern="1200">
+                <a:solidFill>
+                  <a:schemeClr val="lt1"/>
+                </a:solidFill>
+                <a:latin typeface="+mn-lt"/>
+                <a:ea typeface="+mn-ea"/>
+                <a:cs typeface="+mn-cs"/>
+              </a:defRPr>
+            </a:lvl4pPr>
+            <a:lvl5pPr marL="1828800" algn="l" defTabSz="914400" rtl="0" eaLnBrk="1" latinLnBrk="0" hangingPunct="1">
+              <a:defRPr sz="1800" kern="1200">
+                <a:solidFill>
+                  <a:schemeClr val="lt1"/>
+                </a:solidFill>
+                <a:latin typeface="+mn-lt"/>
+                <a:ea typeface="+mn-ea"/>
+                <a:cs typeface="+mn-cs"/>
+              </a:defRPr>
+            </a:lvl5pPr>
+            <a:lvl6pPr marL="2286000" algn="l" defTabSz="914400" rtl="0" eaLnBrk="1" latinLnBrk="0" hangingPunct="1">
+              <a:defRPr sz="1800" kern="1200">
+                <a:solidFill>
+                  <a:schemeClr val="lt1"/>
+                </a:solidFill>
+                <a:latin typeface="+mn-lt"/>
+                <a:ea typeface="+mn-ea"/>
+                <a:cs typeface="+mn-cs"/>
+              </a:defRPr>
+            </a:lvl6pPr>
+            <a:lvl7pPr marL="2743200" algn="l" defTabSz="914400" rtl="0" eaLnBrk="1" latinLnBrk="0" hangingPunct="1">
+              <a:defRPr sz="1800" kern="1200">
+                <a:solidFill>
+                  <a:schemeClr val="lt1"/>
+                </a:solidFill>
+                <a:latin typeface="+mn-lt"/>
+                <a:ea typeface="+mn-ea"/>
+                <a:cs typeface="+mn-cs"/>
+              </a:defRPr>
+            </a:lvl7pPr>
+            <a:lvl8pPr marL="3200400" algn="l" defTabSz="914400" rtl="0" eaLnBrk="1" latinLnBrk="0" hangingPunct="1">
+              <a:defRPr sz="1800" kern="1200">
+                <a:solidFill>
+                  <a:schemeClr val="lt1"/>
+                </a:solidFill>
+                <a:latin typeface="+mn-lt"/>
+                <a:ea typeface="+mn-ea"/>
+                <a:cs typeface="+mn-cs"/>
+              </a:defRPr>
+            </a:lvl8pPr>
+            <a:lvl9pPr marL="3657600" algn="l" defTabSz="914400" rtl="0" eaLnBrk="1" latinLnBrk="0" hangingPunct="1">
+              <a:defRPr sz="1800" kern="1200">
+                <a:solidFill>
+                  <a:schemeClr val="lt1"/>
+                </a:solidFill>
+                <a:latin typeface="+mn-lt"/>
+                <a:ea typeface="+mn-ea"/>
+                <a:cs typeface="+mn-cs"/>
+              </a:defRPr>
+            </a:lvl9pPr>
+          </a:lstStyle>
+          <a:p>
+            <a:pPr algn="ctr"/>
+            <a:endParaRPr lang="en-US"/>
+          </a:p>
+        </p:txBody>
+      </p:sp>
+      <p:pic>
+        <p:nvPicPr>
+          <p:cNvPr id="5" name="Content Placeholder 4">
+            <a:extLst>
+              <a:ext uri="{FF2B5EF4-FFF2-40B4-BE49-F238E27FC236}">
+                <a16:creationId xmlns:a16="http://schemas.microsoft.com/office/drawing/2014/main" id="{C957C40E-CE52-4036-AF9F-5D4305D7A56C}"/>
+              </a:ext>
+            </a:extLst>
+          </p:cNvPr>
+          <p:cNvPicPr>
+            <a:picLocks noGrp="1" noChangeAspect="1"/>
+          </p:cNvPicPr>
           <p:nvPr>
             <p:ph idx="1"/>
           </p:nvPr>
-        </p:nvSpPr>
-        <p:spPr/>
-        <p:txBody>
-          <a:bodyPr/>
-          <a:lstStyle/>
-          <a:p>
-            <a:r>
-              <a:rPr lang="en-GB" dirty="0"/>
-              <a:t>Based in R </a:t>
-            </a:r>
-          </a:p>
-          <a:p>
-            <a:r>
-              <a:rPr lang="en-GB" dirty="0"/>
-              <a:t>Data management </a:t>
-            </a:r>
-            <a:r>
-              <a:rPr lang="en-GB" dirty="0">
-                <a:sym typeface="Wingdings" panose="05000000000000000000" pitchFamily="2" charset="2"/>
-              </a:rPr>
-              <a:t> </a:t>
-            </a:r>
-          </a:p>
-          <a:p>
-            <a:r>
-              <a:rPr lang="en-GB" dirty="0">
-                <a:sym typeface="Wingdings" panose="05000000000000000000" pitchFamily="2" charset="2"/>
-              </a:rPr>
-              <a:t>Integrate well with tools built for cluster computing </a:t>
-            </a:r>
-          </a:p>
-          <a:p>
-            <a:r>
-              <a:rPr lang="en-GB" dirty="0">
-                <a:sym typeface="Wingdings" panose="05000000000000000000" pitchFamily="2" charset="2"/>
-              </a:rPr>
-              <a:t>More stringent checks that re-run the pipeline when scripts/input changes </a:t>
-            </a:r>
-          </a:p>
-          <a:p>
-            <a:r>
-              <a:rPr lang="en-GB" dirty="0"/>
-              <a:t>Demo</a:t>
-            </a:r>
-          </a:p>
-          <a:p>
-            <a:pPr lvl="1"/>
-            <a:r>
-              <a:rPr lang="en-GB" dirty="0"/>
-              <a:t>My workflow</a:t>
-            </a:r>
-          </a:p>
-        </p:txBody>
-      </p:sp>
+        </p:nvPicPr>
+        <p:blipFill rotWithShape="1">
+          <a:blip r:embed="rId2">
+            <a:extLst>
+              <a:ext uri="{28A0092B-C50C-407E-A947-70E740481C1C}">
+                <a14:useLocalDpi xmlns:a14="http://schemas.microsoft.com/office/drawing/2010/main" val="0"/>
+              </a:ext>
+            </a:extLst>
+          </a:blip>
+          <a:srcRect b="15746"/>
+          <a:stretch/>
+        </p:blipFill>
+        <p:spPr>
+          <a:xfrm>
+            <a:off x="20" y="1282"/>
+            <a:ext cx="12191980" cy="6856718"/>
+          </a:xfrm>
+          <a:prstGeom prst="rect">
+            <a:avLst/>
+          </a:prstGeom>
+        </p:spPr>
+      </p:pic>
     </p:spTree>
     <p:extLst>
       <p:ext uri="{BB962C8B-B14F-4D97-AF65-F5344CB8AC3E}">
-        <p14:creationId xmlns:p14="http://schemas.microsoft.com/office/powerpoint/2010/main" val="2196231888"/>
+        <p14:creationId xmlns:p14="http://schemas.microsoft.com/office/powerpoint/2010/main" val="2352425958"/>
       </p:ext>
     </p:extLst>
   </p:cSld>
@@ -4601,7 +4709,7 @@
           <p:cNvPr id="2" name="Title 1">
             <a:extLst>
               <a:ext uri="{FF2B5EF4-FFF2-40B4-BE49-F238E27FC236}">
-                <a16:creationId xmlns:a16="http://schemas.microsoft.com/office/drawing/2014/main" id="{C3085957-3864-4BB3-8F21-0E4F81BF0A75}"/>
+                <a16:creationId xmlns:a16="http://schemas.microsoft.com/office/drawing/2014/main" id="{5EDAE18A-4307-48B1-B0F5-D03F02060835}"/>
               </a:ext>
             </a:extLst>
           </p:cNvPr>
@@ -4619,7 +4727,7 @@
           <a:p>
             <a:r>
               <a:rPr lang="en-GB" dirty="0"/>
-              <a:t>Caveats</a:t>
+              <a:t>Targets</a:t>
             </a:r>
           </a:p>
         </p:txBody>
@@ -4629,7 +4737,7 @@
           <p:cNvPr id="3" name="Content Placeholder 2">
             <a:extLst>
               <a:ext uri="{FF2B5EF4-FFF2-40B4-BE49-F238E27FC236}">
-                <a16:creationId xmlns:a16="http://schemas.microsoft.com/office/drawing/2014/main" id="{77335919-69F3-4D79-A9E7-DF18D9D0F7DB}"/>
+                <a16:creationId xmlns:a16="http://schemas.microsoft.com/office/drawing/2014/main" id="{43E035D1-4941-490A-8C07-78464D93B22F}"/>
               </a:ext>
             </a:extLst>
           </p:cNvPr>
@@ -4642,75 +4750,40 @@
         </p:nvSpPr>
         <p:spPr/>
         <p:txBody>
-          <a:bodyPr>
-            <a:normAutofit lnSpcReduction="10000"/>
-          </a:bodyPr>
+          <a:bodyPr/>
           <a:lstStyle/>
           <a:p>
             <a:r>
               <a:rPr lang="en-GB" dirty="0"/>
-              <a:t>Gall’s law: complex systems are built are working simple systems </a:t>
-            </a:r>
-          </a:p>
-          <a:p>
-            <a:pPr lvl="1"/>
+              <a:t>Based in R </a:t>
+            </a:r>
+          </a:p>
+          <a:p>
             <a:r>
               <a:rPr lang="en-GB" dirty="0"/>
-              <a:t>Iterative approach </a:t>
-            </a:r>
-          </a:p>
-          <a:p>
-            <a:r>
-              <a:rPr lang="en-GB" dirty="0"/>
-              <a:t>Liu’ law: all tools are written by humans (as of now) and therefore all tools can be buggy. </a:t>
-            </a:r>
-          </a:p>
-          <a:p>
-            <a:pPr lvl="1"/>
-            <a:r>
-              <a:rPr lang="en-GB" dirty="0"/>
-              <a:t>No restart computer does not (always) help.</a:t>
-            </a:r>
-          </a:p>
-          <a:p>
-            <a:pPr lvl="1"/>
-            <a:r>
-              <a:rPr lang="en-GB" dirty="0"/>
-              <a:t>Please cite (Liu, 2019+)</a:t>
-            </a:r>
-          </a:p>
-          <a:p>
-            <a:r>
-              <a:rPr lang="en-GB" dirty="0"/>
-              <a:t>Users’ Anguish</a:t>
-            </a:r>
-          </a:p>
-          <a:p>
-            <a:pPr lvl="1"/>
-            <a:r>
-              <a:rPr lang="en-GB" dirty="0"/>
-              <a:t>I do not know how the tool works -&gt; read documentations </a:t>
-            </a:r>
-          </a:p>
-          <a:p>
-            <a:pPr lvl="2"/>
-            <a:r>
-              <a:rPr lang="en-GB" dirty="0"/>
-              <a:t>(which can be incomplete)</a:t>
-            </a:r>
-          </a:p>
-          <a:p>
-            <a:pPr lvl="1"/>
-            <a:r>
-              <a:rPr lang="en-GB" dirty="0"/>
-              <a:t>The developer does not know how I work -&gt; no such functionality </a:t>
-            </a:r>
-          </a:p>
-          <a:p>
-            <a:pPr lvl="1"/>
-            <a:r>
-              <a:rPr lang="en-GB" dirty="0"/>
-              <a:t>The developer does not know how the tool works -&gt; bug</a:t>
+              <a:t>Data management </a:t>
+            </a:r>
+            <a:r>
+              <a:rPr lang="en-GB" dirty="0">
+                <a:sym typeface="Wingdings" panose="05000000000000000000" pitchFamily="2" charset="2"/>
+              </a:rPr>
+              <a:t> </a:t>
+            </a:r>
+          </a:p>
+          <a:p>
+            <a:r>
+              <a:rPr lang="en-GB" dirty="0">
+                <a:sym typeface="Wingdings" panose="05000000000000000000" pitchFamily="2" charset="2"/>
+              </a:rPr>
+              <a:t>Integrate well with tools built for cluster computing </a:t>
+            </a:r>
+          </a:p>
+          <a:p>
+            <a:r>
+              <a:rPr lang="en-GB" dirty="0">
+                <a:sym typeface="Wingdings" panose="05000000000000000000" pitchFamily="2" charset="2"/>
+              </a:rPr>
+              <a:t>More stringent checks that re-run the pipeline when scripts/input changes </a:t>
             </a:r>
           </a:p>
         </p:txBody>
@@ -4718,7 +4791,7 @@
     </p:spTree>
     <p:extLst>
       <p:ext uri="{BB962C8B-B14F-4D97-AF65-F5344CB8AC3E}">
-        <p14:creationId xmlns:p14="http://schemas.microsoft.com/office/powerpoint/2010/main" val="1155224050"/>
+        <p14:creationId xmlns:p14="http://schemas.microsoft.com/office/powerpoint/2010/main" val="2196231888"/>
       </p:ext>
     </p:extLst>
   </p:cSld>
@@ -4750,7 +4823,7 @@
           <p:cNvPr id="2" name="Title 1">
             <a:extLst>
               <a:ext uri="{FF2B5EF4-FFF2-40B4-BE49-F238E27FC236}">
-                <a16:creationId xmlns:a16="http://schemas.microsoft.com/office/drawing/2014/main" id="{66CB3F87-8AA0-4DBB-9D59-C0BA2BE17C53}"/>
+                <a16:creationId xmlns:a16="http://schemas.microsoft.com/office/drawing/2014/main" id="{C3085957-3864-4BB3-8F21-0E4F81BF0A75}"/>
               </a:ext>
             </a:extLst>
           </p:cNvPr>
@@ -4768,7 +4841,7 @@
           <a:p>
             <a:r>
               <a:rPr lang="en-GB" dirty="0"/>
-              <a:t>Things did help:</a:t>
+              <a:t>Caveats</a:t>
             </a:r>
           </a:p>
         </p:txBody>
@@ -4778,7 +4851,7 @@
           <p:cNvPr id="3" name="Content Placeholder 2">
             <a:extLst>
               <a:ext uri="{FF2B5EF4-FFF2-40B4-BE49-F238E27FC236}">
-                <a16:creationId xmlns:a16="http://schemas.microsoft.com/office/drawing/2014/main" id="{649703E6-3D77-4EFB-899A-108BD6CC7960}"/>
+                <a16:creationId xmlns:a16="http://schemas.microsoft.com/office/drawing/2014/main" id="{77335919-69F3-4D79-A9E7-DF18D9D0F7DB}"/>
               </a:ext>
             </a:extLst>
           </p:cNvPr>
@@ -4798,6 +4871,469 @@
           <a:p>
             <a:r>
               <a:rPr lang="en-GB" dirty="0"/>
+              <a:t>Gall’s law: complex systems are built from working simple systems </a:t>
+            </a:r>
+          </a:p>
+          <a:p>
+            <a:pPr lvl="1"/>
+            <a:r>
+              <a:rPr lang="en-GB" dirty="0"/>
+              <a:t>Iterative approach </a:t>
+            </a:r>
+          </a:p>
+          <a:p>
+            <a:r>
+              <a:rPr lang="en-GB" dirty="0"/>
+              <a:t>Liu’ law: all tools are written by humans (as of now) and therefore all tools can be buggy. </a:t>
+            </a:r>
+          </a:p>
+          <a:p>
+            <a:pPr lvl="1"/>
+            <a:r>
+              <a:rPr lang="en-GB" dirty="0"/>
+              <a:t>No restart computer does not (always) help.</a:t>
+            </a:r>
+          </a:p>
+          <a:p>
+            <a:pPr lvl="1"/>
+            <a:r>
+              <a:rPr lang="en-GB" dirty="0"/>
+              <a:t>Please cite (Liu, 2019+)</a:t>
+            </a:r>
+          </a:p>
+          <a:p>
+            <a:r>
+              <a:rPr lang="en-GB" dirty="0"/>
+              <a:t>Users’ Anguish</a:t>
+            </a:r>
+          </a:p>
+          <a:p>
+            <a:pPr lvl="1"/>
+            <a:r>
+              <a:rPr lang="en-GB" dirty="0"/>
+              <a:t>I do not know how the tool works -&gt; read documentations </a:t>
+            </a:r>
+          </a:p>
+          <a:p>
+            <a:pPr lvl="2"/>
+            <a:r>
+              <a:rPr lang="en-GB" dirty="0"/>
+              <a:t>(which can be incomplete)</a:t>
+            </a:r>
+          </a:p>
+          <a:p>
+            <a:pPr lvl="1"/>
+            <a:r>
+              <a:rPr lang="en-GB" dirty="0"/>
+              <a:t>The developer does not know how I work -&gt; no such functionality </a:t>
+            </a:r>
+          </a:p>
+          <a:p>
+            <a:pPr lvl="1"/>
+            <a:r>
+              <a:rPr lang="en-GB" dirty="0"/>
+              <a:t>The developer does not know how the tool works -&gt; bug</a:t>
+            </a:r>
+          </a:p>
+        </p:txBody>
+      </p:sp>
+    </p:spTree>
+    <p:extLst>
+      <p:ext uri="{BB962C8B-B14F-4D97-AF65-F5344CB8AC3E}">
+        <p14:creationId xmlns:p14="http://schemas.microsoft.com/office/powerpoint/2010/main" val="1155224050"/>
+      </p:ext>
+    </p:extLst>
+  </p:cSld>
+  <p:clrMapOvr>
+    <a:masterClrMapping/>
+  </p:clrMapOvr>
+  <p:timing>
+    <p:tnLst>
+      <p:par>
+        <p:cTn id="1" dur="indefinite" restart="never" nodeType="tmRoot">
+          <p:childTnLst>
+            <p:seq concurrent="1" nextAc="seek">
+              <p:cTn id="2" dur="indefinite" nodeType="mainSeq">
+                <p:childTnLst>
+                  <p:par>
+                    <p:cTn id="3" fill="hold">
+                      <p:stCondLst>
+                        <p:cond delay="indefinite"/>
+                      </p:stCondLst>
+                      <p:childTnLst>
+                        <p:par>
+                          <p:cTn id="4" fill="hold">
+                            <p:stCondLst>
+                              <p:cond delay="0"/>
+                            </p:stCondLst>
+                            <p:childTnLst>
+                              <p:par>
+                                <p:cTn id="5" presetID="1" presetClass="entr" presetSubtype="0" fill="hold" nodeType="clickEffect">
+                                  <p:stCondLst>
+                                    <p:cond delay="0"/>
+                                  </p:stCondLst>
+                                  <p:childTnLst>
+                                    <p:set>
+                                      <p:cBhvr>
+                                        <p:cTn id="6" dur="1" fill="hold">
+                                          <p:stCondLst>
+                                            <p:cond delay="0"/>
+                                          </p:stCondLst>
+                                        </p:cTn>
+                                        <p:tgtEl>
+                                          <p:spTgt spid="3">
+                                            <p:txEl>
+                                              <p:pRg st="2" end="2"/>
+                                            </p:txEl>
+                                          </p:spTgt>
+                                        </p:tgtEl>
+                                        <p:attrNameLst>
+                                          <p:attrName>style.visibility</p:attrName>
+                                        </p:attrNameLst>
+                                      </p:cBhvr>
+                                      <p:to>
+                                        <p:strVal val="visible"/>
+                                      </p:to>
+                                    </p:set>
+                                  </p:childTnLst>
+                                </p:cTn>
+                              </p:par>
+                              <p:par>
+                                <p:cTn id="7" presetID="1" presetClass="entr" presetSubtype="0" fill="hold" nodeType="withEffect">
+                                  <p:stCondLst>
+                                    <p:cond delay="0"/>
+                                  </p:stCondLst>
+                                  <p:childTnLst>
+                                    <p:set>
+                                      <p:cBhvr>
+                                        <p:cTn id="8" dur="1" fill="hold">
+                                          <p:stCondLst>
+                                            <p:cond delay="0"/>
+                                          </p:stCondLst>
+                                        </p:cTn>
+                                        <p:tgtEl>
+                                          <p:spTgt spid="3">
+                                            <p:txEl>
+                                              <p:pRg st="3" end="3"/>
+                                            </p:txEl>
+                                          </p:spTgt>
+                                        </p:tgtEl>
+                                        <p:attrNameLst>
+                                          <p:attrName>style.visibility</p:attrName>
+                                        </p:attrNameLst>
+                                      </p:cBhvr>
+                                      <p:to>
+                                        <p:strVal val="visible"/>
+                                      </p:to>
+                                    </p:set>
+                                  </p:childTnLst>
+                                </p:cTn>
+                              </p:par>
+                              <p:par>
+                                <p:cTn id="9" presetID="1" presetClass="entr" presetSubtype="0" fill="hold" nodeType="withEffect">
+                                  <p:stCondLst>
+                                    <p:cond delay="0"/>
+                                  </p:stCondLst>
+                                  <p:childTnLst>
+                                    <p:set>
+                                      <p:cBhvr>
+                                        <p:cTn id="10" dur="1" fill="hold">
+                                          <p:stCondLst>
+                                            <p:cond delay="0"/>
+                                          </p:stCondLst>
+                                        </p:cTn>
+                                        <p:tgtEl>
+                                          <p:spTgt spid="3">
+                                            <p:txEl>
+                                              <p:pRg st="4" end="4"/>
+                                            </p:txEl>
+                                          </p:spTgt>
+                                        </p:tgtEl>
+                                        <p:attrNameLst>
+                                          <p:attrName>style.visibility</p:attrName>
+                                        </p:attrNameLst>
+                                      </p:cBhvr>
+                                      <p:to>
+                                        <p:strVal val="visible"/>
+                                      </p:to>
+                                    </p:set>
+                                  </p:childTnLst>
+                                </p:cTn>
+                              </p:par>
+                            </p:childTnLst>
+                          </p:cTn>
+                        </p:par>
+                      </p:childTnLst>
+                    </p:cTn>
+                  </p:par>
+                  <p:par>
+                    <p:cTn id="11" fill="hold">
+                      <p:stCondLst>
+                        <p:cond delay="indefinite"/>
+                      </p:stCondLst>
+                      <p:childTnLst>
+                        <p:par>
+                          <p:cTn id="12" fill="hold">
+                            <p:stCondLst>
+                              <p:cond delay="0"/>
+                            </p:stCondLst>
+                            <p:childTnLst>
+                              <p:par>
+                                <p:cTn id="13" presetID="1" presetClass="entr" presetSubtype="0" fill="hold" nodeType="clickEffect">
+                                  <p:stCondLst>
+                                    <p:cond delay="0"/>
+                                  </p:stCondLst>
+                                  <p:childTnLst>
+                                    <p:set>
+                                      <p:cBhvr>
+                                        <p:cTn id="14" dur="1" fill="hold">
+                                          <p:stCondLst>
+                                            <p:cond delay="0"/>
+                                          </p:stCondLst>
+                                        </p:cTn>
+                                        <p:tgtEl>
+                                          <p:spTgt spid="3">
+                                            <p:txEl>
+                                              <p:pRg st="5" end="5"/>
+                                            </p:txEl>
+                                          </p:spTgt>
+                                        </p:tgtEl>
+                                        <p:attrNameLst>
+                                          <p:attrName>style.visibility</p:attrName>
+                                        </p:attrNameLst>
+                                      </p:cBhvr>
+                                      <p:to>
+                                        <p:strVal val="visible"/>
+                                      </p:to>
+                                    </p:set>
+                                  </p:childTnLst>
+                                </p:cTn>
+                              </p:par>
+                              <p:par>
+                                <p:cTn id="15" presetID="1" presetClass="entr" presetSubtype="0" fill="hold" nodeType="withEffect">
+                                  <p:stCondLst>
+                                    <p:cond delay="0"/>
+                                  </p:stCondLst>
+                                  <p:childTnLst>
+                                    <p:set>
+                                      <p:cBhvr>
+                                        <p:cTn id="16" dur="1" fill="hold">
+                                          <p:stCondLst>
+                                            <p:cond delay="0"/>
+                                          </p:stCondLst>
+                                        </p:cTn>
+                                        <p:tgtEl>
+                                          <p:spTgt spid="3">
+                                            <p:txEl>
+                                              <p:pRg st="6" end="6"/>
+                                            </p:txEl>
+                                          </p:spTgt>
+                                        </p:tgtEl>
+                                        <p:attrNameLst>
+                                          <p:attrName>style.visibility</p:attrName>
+                                        </p:attrNameLst>
+                                      </p:cBhvr>
+                                      <p:to>
+                                        <p:strVal val="visible"/>
+                                      </p:to>
+                                    </p:set>
+                                  </p:childTnLst>
+                                </p:cTn>
+                              </p:par>
+                              <p:par>
+                                <p:cTn id="17" presetID="1" presetClass="entr" presetSubtype="0" fill="hold" nodeType="withEffect">
+                                  <p:stCondLst>
+                                    <p:cond delay="0"/>
+                                  </p:stCondLst>
+                                  <p:childTnLst>
+                                    <p:set>
+                                      <p:cBhvr>
+                                        <p:cTn id="18" dur="1" fill="hold">
+                                          <p:stCondLst>
+                                            <p:cond delay="0"/>
+                                          </p:stCondLst>
+                                        </p:cTn>
+                                        <p:tgtEl>
+                                          <p:spTgt spid="3">
+                                            <p:txEl>
+                                              <p:pRg st="7" end="7"/>
+                                            </p:txEl>
+                                          </p:spTgt>
+                                        </p:tgtEl>
+                                        <p:attrNameLst>
+                                          <p:attrName>style.visibility</p:attrName>
+                                        </p:attrNameLst>
+                                      </p:cBhvr>
+                                      <p:to>
+                                        <p:strVal val="visible"/>
+                                      </p:to>
+                                    </p:set>
+                                  </p:childTnLst>
+                                </p:cTn>
+                              </p:par>
+                              <p:par>
+                                <p:cTn id="19" presetID="1" presetClass="entr" presetSubtype="0" fill="hold" nodeType="withEffect">
+                                  <p:stCondLst>
+                                    <p:cond delay="0"/>
+                                  </p:stCondLst>
+                                  <p:childTnLst>
+                                    <p:set>
+                                      <p:cBhvr>
+                                        <p:cTn id="20" dur="1" fill="hold">
+                                          <p:stCondLst>
+                                            <p:cond delay="0"/>
+                                          </p:stCondLst>
+                                        </p:cTn>
+                                        <p:tgtEl>
+                                          <p:spTgt spid="3">
+                                            <p:txEl>
+                                              <p:pRg st="8" end="8"/>
+                                            </p:txEl>
+                                          </p:spTgt>
+                                        </p:tgtEl>
+                                        <p:attrNameLst>
+                                          <p:attrName>style.visibility</p:attrName>
+                                        </p:attrNameLst>
+                                      </p:cBhvr>
+                                      <p:to>
+                                        <p:strVal val="visible"/>
+                                      </p:to>
+                                    </p:set>
+                                  </p:childTnLst>
+                                </p:cTn>
+                              </p:par>
+                              <p:par>
+                                <p:cTn id="21" presetID="1" presetClass="entr" presetSubtype="0" fill="hold" nodeType="withEffect">
+                                  <p:stCondLst>
+                                    <p:cond delay="0"/>
+                                  </p:stCondLst>
+                                  <p:childTnLst>
+                                    <p:set>
+                                      <p:cBhvr>
+                                        <p:cTn id="22" dur="1" fill="hold">
+                                          <p:stCondLst>
+                                            <p:cond delay="0"/>
+                                          </p:stCondLst>
+                                        </p:cTn>
+                                        <p:tgtEl>
+                                          <p:spTgt spid="3">
+                                            <p:txEl>
+                                              <p:pRg st="9" end="9"/>
+                                            </p:txEl>
+                                          </p:spTgt>
+                                        </p:tgtEl>
+                                        <p:attrNameLst>
+                                          <p:attrName>style.visibility</p:attrName>
+                                        </p:attrNameLst>
+                                      </p:cBhvr>
+                                      <p:to>
+                                        <p:strVal val="visible"/>
+                                      </p:to>
+                                    </p:set>
+                                  </p:childTnLst>
+                                </p:cTn>
+                              </p:par>
+                            </p:childTnLst>
+                          </p:cTn>
+                        </p:par>
+                      </p:childTnLst>
+                    </p:cTn>
+                  </p:par>
+                </p:childTnLst>
+              </p:cTn>
+              <p:prevCondLst>
+                <p:cond evt="onPrev" delay="0">
+                  <p:tgtEl>
+                    <p:sldTgt/>
+                  </p:tgtEl>
+                </p:cond>
+              </p:prevCondLst>
+              <p:nextCondLst>
+                <p:cond evt="onNext" delay="0">
+                  <p:tgtEl>
+                    <p:sldTgt/>
+                  </p:tgtEl>
+                </p:cond>
+              </p:nextCondLst>
+            </p:seq>
+          </p:childTnLst>
+        </p:cTn>
+      </p:par>
+    </p:tnLst>
+  </p:timing>
+</p:sld>
+</file>
+
+<file path=ppt/slides/slide14.xml><?xml version="1.0" encoding="utf-8"?>
+<p:sld xmlns:a="http://schemas.openxmlformats.org/drawingml/2006/main" xmlns:r="http://schemas.openxmlformats.org/officeDocument/2006/relationships" xmlns:p="http://schemas.openxmlformats.org/presentationml/2006/main">
+  <p:cSld>
+    <p:spTree>
+      <p:nvGrpSpPr>
+        <p:cNvPr id="1" name=""/>
+        <p:cNvGrpSpPr/>
+        <p:nvPr/>
+      </p:nvGrpSpPr>
+      <p:grpSpPr>
+        <a:xfrm>
+          <a:off x="0" y="0"/>
+          <a:ext cx="0" cy="0"/>
+          <a:chOff x="0" y="0"/>
+          <a:chExt cx="0" cy="0"/>
+        </a:xfrm>
+      </p:grpSpPr>
+      <p:sp>
+        <p:nvSpPr>
+          <p:cNvPr id="2" name="Title 1">
+            <a:extLst>
+              <a:ext uri="{FF2B5EF4-FFF2-40B4-BE49-F238E27FC236}">
+                <a16:creationId xmlns:a16="http://schemas.microsoft.com/office/drawing/2014/main" id="{66CB3F87-8AA0-4DBB-9D59-C0BA2BE17C53}"/>
+              </a:ext>
+            </a:extLst>
+          </p:cNvPr>
+          <p:cNvSpPr>
+            <a:spLocks noGrp="1"/>
+          </p:cNvSpPr>
+          <p:nvPr>
+            <p:ph type="title"/>
+          </p:nvPr>
+        </p:nvSpPr>
+        <p:spPr/>
+        <p:txBody>
+          <a:bodyPr/>
+          <a:lstStyle/>
+          <a:p>
+            <a:r>
+              <a:rPr lang="en-GB" dirty="0"/>
+              <a:t>Things did help:</a:t>
+            </a:r>
+          </a:p>
+        </p:txBody>
+      </p:sp>
+      <p:sp>
+        <p:nvSpPr>
+          <p:cNvPr id="3" name="Content Placeholder 2">
+            <a:extLst>
+              <a:ext uri="{FF2B5EF4-FFF2-40B4-BE49-F238E27FC236}">
+                <a16:creationId xmlns:a16="http://schemas.microsoft.com/office/drawing/2014/main" id="{649703E6-3D77-4EFB-899A-108BD6CC7960}"/>
+              </a:ext>
+            </a:extLst>
+          </p:cNvPr>
+          <p:cNvSpPr>
+            <a:spLocks noGrp="1"/>
+          </p:cNvSpPr>
+          <p:nvPr>
+            <p:ph idx="1"/>
+          </p:nvPr>
+        </p:nvSpPr>
+        <p:spPr/>
+        <p:txBody>
+          <a:bodyPr>
+            <a:normAutofit lnSpcReduction="10000"/>
+          </a:bodyPr>
+          <a:lstStyle/>
+          <a:p>
+            <a:r>
+              <a:rPr lang="en-GB" dirty="0"/>
               <a:t>Reduce the complexity </a:t>
             </a:r>
           </a:p>
@@ -4874,7 +5410,31 @@
           <a:p>
             <a:r>
               <a:rPr lang="en-GB" dirty="0"/>
-              <a:t>Ask</a:t>
+              <a:t>Ask (</a:t>
+            </a:r>
+            <a:r>
+              <a:rPr lang="en-GB" dirty="0" err="1"/>
+              <a:t>snakemake</a:t>
+            </a:r>
+            <a:r>
+              <a:rPr lang="en-GB" dirty="0"/>
+              <a:t>: </a:t>
+            </a:r>
+            <a:r>
+              <a:rPr lang="en-GB" dirty="0" err="1"/>
+              <a:t>stackoverflow</a:t>
+            </a:r>
+            <a:r>
+              <a:rPr lang="en-GB" dirty="0"/>
+              <a:t>; targets: </a:t>
+            </a:r>
+            <a:r>
+              <a:rPr lang="en-GB" dirty="0" err="1"/>
+              <a:t>github</a:t>
+            </a:r>
+            <a:r>
+              <a:rPr lang="en-GB" dirty="0"/>
+              <a:t> issues)</a:t>
             </a:r>
           </a:p>
           <a:p>
@@ -4913,11 +5473,235 @@
   <p:clrMapOvr>
     <a:masterClrMapping/>
   </p:clrMapOvr>
+  <p:timing>
+    <p:tnLst>
+      <p:par>
+        <p:cTn id="1" dur="indefinite" restart="never" nodeType="tmRoot">
+          <p:childTnLst>
+            <p:seq concurrent="1" nextAc="seek">
+              <p:cTn id="2" dur="indefinite" nodeType="mainSeq">
+                <p:childTnLst>
+                  <p:par>
+                    <p:cTn id="3" fill="hold">
+                      <p:stCondLst>
+                        <p:cond delay="indefinite"/>
+                      </p:stCondLst>
+                      <p:childTnLst>
+                        <p:par>
+                          <p:cTn id="4" fill="hold">
+                            <p:stCondLst>
+                              <p:cond delay="0"/>
+                            </p:stCondLst>
+                            <p:childTnLst>
+                              <p:par>
+                                <p:cTn id="5" presetID="1" presetClass="entr" presetSubtype="0" fill="hold" nodeType="clickEffect">
+                                  <p:stCondLst>
+                                    <p:cond delay="0"/>
+                                  </p:stCondLst>
+                                  <p:childTnLst>
+                                    <p:set>
+                                      <p:cBhvr>
+                                        <p:cTn id="6" dur="1" fill="hold">
+                                          <p:stCondLst>
+                                            <p:cond delay="0"/>
+                                          </p:stCondLst>
+                                        </p:cTn>
+                                        <p:tgtEl>
+                                          <p:spTgt spid="3">
+                                            <p:txEl>
+                                              <p:pRg st="7" end="7"/>
+                                            </p:txEl>
+                                          </p:spTgt>
+                                        </p:tgtEl>
+                                        <p:attrNameLst>
+                                          <p:attrName>style.visibility</p:attrName>
+                                        </p:attrNameLst>
+                                      </p:cBhvr>
+                                      <p:to>
+                                        <p:strVal val="visible"/>
+                                      </p:to>
+                                    </p:set>
+                                  </p:childTnLst>
+                                </p:cTn>
+                              </p:par>
+                              <p:par>
+                                <p:cTn id="7" presetID="1" presetClass="entr" presetSubtype="0" fill="hold" nodeType="withEffect">
+                                  <p:stCondLst>
+                                    <p:cond delay="0"/>
+                                  </p:stCondLst>
+                                  <p:childTnLst>
+                                    <p:set>
+                                      <p:cBhvr>
+                                        <p:cTn id="8" dur="1" fill="hold">
+                                          <p:stCondLst>
+                                            <p:cond delay="0"/>
+                                          </p:stCondLst>
+                                        </p:cTn>
+                                        <p:tgtEl>
+                                          <p:spTgt spid="3">
+                                            <p:txEl>
+                                              <p:pRg st="8" end="8"/>
+                                            </p:txEl>
+                                          </p:spTgt>
+                                        </p:tgtEl>
+                                        <p:attrNameLst>
+                                          <p:attrName>style.visibility</p:attrName>
+                                        </p:attrNameLst>
+                                      </p:cBhvr>
+                                      <p:to>
+                                        <p:strVal val="visible"/>
+                                      </p:to>
+                                    </p:set>
+                                  </p:childTnLst>
+                                </p:cTn>
+                              </p:par>
+                              <p:par>
+                                <p:cTn id="9" presetID="1" presetClass="entr" presetSubtype="0" fill="hold" nodeType="withEffect">
+                                  <p:stCondLst>
+                                    <p:cond delay="0"/>
+                                  </p:stCondLst>
+                                  <p:childTnLst>
+                                    <p:set>
+                                      <p:cBhvr>
+                                        <p:cTn id="10" dur="1" fill="hold">
+                                          <p:stCondLst>
+                                            <p:cond delay="0"/>
+                                          </p:stCondLst>
+                                        </p:cTn>
+                                        <p:tgtEl>
+                                          <p:spTgt spid="3">
+                                            <p:txEl>
+                                              <p:pRg st="9" end="9"/>
+                                            </p:txEl>
+                                          </p:spTgt>
+                                        </p:tgtEl>
+                                        <p:attrNameLst>
+                                          <p:attrName>style.visibility</p:attrName>
+                                        </p:attrNameLst>
+                                      </p:cBhvr>
+                                      <p:to>
+                                        <p:strVal val="visible"/>
+                                      </p:to>
+                                    </p:set>
+                                  </p:childTnLst>
+                                </p:cTn>
+                              </p:par>
+                            </p:childTnLst>
+                          </p:cTn>
+                        </p:par>
+                      </p:childTnLst>
+                    </p:cTn>
+                  </p:par>
+                </p:childTnLst>
+              </p:cTn>
+              <p:prevCondLst>
+                <p:cond evt="onPrev" delay="0">
+                  <p:tgtEl>
+                    <p:sldTgt/>
+                  </p:tgtEl>
+                </p:cond>
+              </p:prevCondLst>
+              <p:nextCondLst>
+                <p:cond evt="onNext" delay="0">
+                  <p:tgtEl>
+                    <p:sldTgt/>
+                  </p:tgtEl>
+                </p:cond>
+              </p:nextCondLst>
+            </p:seq>
+          </p:childTnLst>
+        </p:cTn>
+      </p:par>
+    </p:tnLst>
+  </p:timing>
+</p:sld>
+</file>
+
+<file path=ppt/slides/slide15.xml><?xml version="1.0" encoding="utf-8"?>
+<p:sld xmlns:a="http://schemas.openxmlformats.org/drawingml/2006/main" xmlns:r="http://schemas.openxmlformats.org/officeDocument/2006/relationships" xmlns:p="http://schemas.openxmlformats.org/presentationml/2006/main">
+  <p:cSld>
+    <p:spTree>
+      <p:nvGrpSpPr>
+        <p:cNvPr id="1" name=""/>
+        <p:cNvGrpSpPr/>
+        <p:nvPr/>
+      </p:nvGrpSpPr>
+      <p:grpSpPr>
+        <a:xfrm>
+          <a:off x="0" y="0"/>
+          <a:ext cx="0" cy="0"/>
+          <a:chOff x="0" y="0"/>
+          <a:chExt cx="0" cy="0"/>
+        </a:xfrm>
+      </p:grpSpPr>
+      <p:sp>
+        <p:nvSpPr>
+          <p:cNvPr id="2" name="Title 1">
+            <a:extLst>
+              <a:ext uri="{FF2B5EF4-FFF2-40B4-BE49-F238E27FC236}">
+                <a16:creationId xmlns:a16="http://schemas.microsoft.com/office/drawing/2014/main" id="{6FE8BBBA-D64D-4CCE-98D0-AF66B39BAF74}"/>
+              </a:ext>
+            </a:extLst>
+          </p:cNvPr>
+          <p:cNvSpPr>
+            <a:spLocks noGrp="1"/>
+          </p:cNvSpPr>
+          <p:nvPr>
+            <p:ph type="title"/>
+          </p:nvPr>
+        </p:nvSpPr>
+        <p:spPr/>
+        <p:txBody>
+          <a:bodyPr/>
+          <a:lstStyle/>
+          <a:p>
+            <a:r>
+              <a:rPr lang="en-GB" dirty="0"/>
+              <a:t>Thank you</a:t>
+            </a:r>
+          </a:p>
+        </p:txBody>
+      </p:sp>
+      <p:sp>
+        <p:nvSpPr>
+          <p:cNvPr id="3" name="Content Placeholder 2">
+            <a:extLst>
+              <a:ext uri="{FF2B5EF4-FFF2-40B4-BE49-F238E27FC236}">
+                <a16:creationId xmlns:a16="http://schemas.microsoft.com/office/drawing/2014/main" id="{FDE5CB40-4EC0-47C5-BC45-6B462D9AC649}"/>
+              </a:ext>
+            </a:extLst>
+          </p:cNvPr>
+          <p:cNvSpPr>
+            <a:spLocks noGrp="1"/>
+          </p:cNvSpPr>
+          <p:nvPr>
+            <p:ph idx="1"/>
+          </p:nvPr>
+        </p:nvSpPr>
+        <p:spPr/>
+        <p:txBody>
+          <a:bodyPr/>
+          <a:lstStyle/>
+          <a:p>
+            <a:endParaRPr lang="en-GB"/>
+          </a:p>
+        </p:txBody>
+      </p:sp>
+    </p:spTree>
+    <p:extLst>
+      <p:ext uri="{BB962C8B-B14F-4D97-AF65-F5344CB8AC3E}">
+        <p14:creationId xmlns:p14="http://schemas.microsoft.com/office/powerpoint/2010/main" val="3933871126"/>
+      </p:ext>
+    </p:extLst>
+  </p:cSld>
+  <p:clrMapOvr>
+    <a:masterClrMapping/>
+  </p:clrMapOvr>
 </p:sld>
 </file>
 
 <file path=ppt/slides/slide2.xml><?xml version="1.0" encoding="utf-8"?>
-<p:sld xmlns:a="http://schemas.openxmlformats.org/drawingml/2006/main" xmlns:r="http://schemas.openxmlformats.org/officeDocument/2006/relationships" xmlns:p="http://schemas.openxmlformats.org/presentationml/2006/main">
+<p:sld xmlns:a="http://schemas.openxmlformats.org/drawingml/2006/main" xmlns:r="http://schemas.openxmlformats.org/officeDocument/2006/relationships" xmlns:p="http://schemas.openxmlformats.org/presentationml/2006/main" show="0">
   <p:cSld>
     <p:spTree>
       <p:nvGrpSpPr>
@@ -5450,6 +6234,45 @@
           </a:prstGeom>
         </p:spPr>
       </p:pic>
+      <p:sp>
+        <p:nvSpPr>
+          <p:cNvPr id="2" name="TextBox 1">
+            <a:extLst>
+              <a:ext uri="{FF2B5EF4-FFF2-40B4-BE49-F238E27FC236}">
+                <a16:creationId xmlns:a16="http://schemas.microsoft.com/office/drawing/2014/main" id="{CDA89F8D-BB01-47E7-B686-107B649F25D8}"/>
+              </a:ext>
+            </a:extLst>
+          </p:cNvPr>
+          <p:cNvSpPr txBox="1"/>
+          <p:nvPr/>
+        </p:nvSpPr>
+        <p:spPr>
+          <a:xfrm>
+            <a:off x="9262533" y="6180667"/>
+            <a:ext cx="1913467" cy="646331"/>
+          </a:xfrm>
+          <a:prstGeom prst="rect">
+            <a:avLst/>
+          </a:prstGeom>
+          <a:noFill/>
+        </p:spPr>
+        <p:txBody>
+          <a:bodyPr wrap="square" rtlCol="0">
+            <a:spAutoFit/>
+          </a:bodyPr>
+          <a:lstStyle/>
+          <a:p>
+            <a:r>
+              <a:rPr lang="en-GB" sz="3600" dirty="0">
+                <a:solidFill>
+                  <a:schemeClr val="bg1"/>
+                </a:solidFill>
+              </a:rPr>
+              <a:t>Skill</a:t>
+            </a:r>
+          </a:p>
+        </p:txBody>
+      </p:sp>
     </p:spTree>
     <p:extLst>
       <p:ext uri="{BB962C8B-B14F-4D97-AF65-F5344CB8AC3E}">

</xml_diff>